<commit_message>
Formula in Chapter2 almost Finish.
</commit_message>
<xml_diff>
--- a/rst/Figures.pptx
+++ b/rst/Figures.pptx
@@ -7,6 +7,7 @@
   <p:sldIdLst>
     <p:sldId id="256" r:id="rId2"/>
     <p:sldId id="257" r:id="rId3"/>
+    <p:sldId id="258" r:id="rId4"/>
   </p:sldIdLst>
   <p:sldSz cx="9144000" cy="6858000" type="screen4x3"/>
   <p:notesSz cx="6858000" cy="9144000"/>
@@ -290,7 +291,7 @@
             <a:fld id="{530820CF-B880-4189-942D-D702A7CBA730}" type="datetimeFigureOut">
               <a:rPr lang="zh-CN" altLang="en-US" smtClean="0"/>
               <a:pPr/>
-              <a:t>2017/3/10</a:t>
+              <a:t>2017/3/11</a:t>
             </a:fld>
             <a:endParaRPr lang="zh-CN" altLang="en-US"/>
           </a:p>
@@ -457,7 +458,7 @@
             <a:fld id="{530820CF-B880-4189-942D-D702A7CBA730}" type="datetimeFigureOut">
               <a:rPr lang="zh-CN" altLang="en-US" smtClean="0"/>
               <a:pPr/>
-              <a:t>2017/3/10</a:t>
+              <a:t>2017/3/11</a:t>
             </a:fld>
             <a:endParaRPr lang="zh-CN" altLang="en-US"/>
           </a:p>
@@ -634,7 +635,7 @@
             <a:fld id="{530820CF-B880-4189-942D-D702A7CBA730}" type="datetimeFigureOut">
               <a:rPr lang="zh-CN" altLang="en-US" smtClean="0"/>
               <a:pPr/>
-              <a:t>2017/3/10</a:t>
+              <a:t>2017/3/11</a:t>
             </a:fld>
             <a:endParaRPr lang="zh-CN" altLang="en-US"/>
           </a:p>
@@ -801,7 +802,7 @@
             <a:fld id="{530820CF-B880-4189-942D-D702A7CBA730}" type="datetimeFigureOut">
               <a:rPr lang="zh-CN" altLang="en-US" smtClean="0"/>
               <a:pPr/>
-              <a:t>2017/3/10</a:t>
+              <a:t>2017/3/11</a:t>
             </a:fld>
             <a:endParaRPr lang="zh-CN" altLang="en-US"/>
           </a:p>
@@ -1044,7 +1045,7 @@
             <a:fld id="{530820CF-B880-4189-942D-D702A7CBA730}" type="datetimeFigureOut">
               <a:rPr lang="zh-CN" altLang="en-US" smtClean="0"/>
               <a:pPr/>
-              <a:t>2017/3/10</a:t>
+              <a:t>2017/3/11</a:t>
             </a:fld>
             <a:endParaRPr lang="zh-CN" altLang="en-US"/>
           </a:p>
@@ -1329,7 +1330,7 @@
             <a:fld id="{530820CF-B880-4189-942D-D702A7CBA730}" type="datetimeFigureOut">
               <a:rPr lang="zh-CN" altLang="en-US" smtClean="0"/>
               <a:pPr/>
-              <a:t>2017/3/10</a:t>
+              <a:t>2017/3/11</a:t>
             </a:fld>
             <a:endParaRPr lang="zh-CN" altLang="en-US"/>
           </a:p>
@@ -1748,7 +1749,7 @@
             <a:fld id="{530820CF-B880-4189-942D-D702A7CBA730}" type="datetimeFigureOut">
               <a:rPr lang="zh-CN" altLang="en-US" smtClean="0"/>
               <a:pPr/>
-              <a:t>2017/3/10</a:t>
+              <a:t>2017/3/11</a:t>
             </a:fld>
             <a:endParaRPr lang="zh-CN" altLang="en-US"/>
           </a:p>
@@ -1863,7 +1864,7 @@
             <a:fld id="{530820CF-B880-4189-942D-D702A7CBA730}" type="datetimeFigureOut">
               <a:rPr lang="zh-CN" altLang="en-US" smtClean="0"/>
               <a:pPr/>
-              <a:t>2017/3/10</a:t>
+              <a:t>2017/3/11</a:t>
             </a:fld>
             <a:endParaRPr lang="zh-CN" altLang="en-US"/>
           </a:p>
@@ -1955,7 +1956,7 @@
             <a:fld id="{530820CF-B880-4189-942D-D702A7CBA730}" type="datetimeFigureOut">
               <a:rPr lang="zh-CN" altLang="en-US" smtClean="0"/>
               <a:pPr/>
-              <a:t>2017/3/10</a:t>
+              <a:t>2017/3/11</a:t>
             </a:fld>
             <a:endParaRPr lang="zh-CN" altLang="en-US"/>
           </a:p>
@@ -2229,7 +2230,7 @@
             <a:fld id="{530820CF-B880-4189-942D-D702A7CBA730}" type="datetimeFigureOut">
               <a:rPr lang="zh-CN" altLang="en-US" smtClean="0"/>
               <a:pPr/>
-              <a:t>2017/3/10</a:t>
+              <a:t>2017/3/11</a:t>
             </a:fld>
             <a:endParaRPr lang="zh-CN" altLang="en-US"/>
           </a:p>
@@ -2479,7 +2480,7 @@
             <a:fld id="{530820CF-B880-4189-942D-D702A7CBA730}" type="datetimeFigureOut">
               <a:rPr lang="zh-CN" altLang="en-US" smtClean="0"/>
               <a:pPr/>
-              <a:t>2017/3/10</a:t>
+              <a:t>2017/3/11</a:t>
             </a:fld>
             <a:endParaRPr lang="zh-CN" altLang="en-US"/>
           </a:p>
@@ -2689,7 +2690,7 @@
             <a:fld id="{530820CF-B880-4189-942D-D702A7CBA730}" type="datetimeFigureOut">
               <a:rPr lang="zh-CN" altLang="en-US" smtClean="0"/>
               <a:pPr/>
-              <a:t>2017/3/10</a:t>
+              <a:t>2017/3/11</a:t>
             </a:fld>
             <a:endParaRPr lang="zh-CN" altLang="en-US"/>
           </a:p>
@@ -6072,6 +6073,562 @@
 </p:sld>
 </file>
 
+<file path=ppt/slides/slide3.xml><?xml version="1.0" encoding="utf-8"?>
+<p:sld xmlns:a="http://schemas.openxmlformats.org/drawingml/2006/main" xmlns:r="http://schemas.openxmlformats.org/officeDocument/2006/relationships" xmlns:p="http://schemas.openxmlformats.org/presentationml/2006/main">
+  <p:cSld>
+    <p:spTree>
+      <p:nvGrpSpPr>
+        <p:cNvPr id="1" name=""/>
+        <p:cNvGrpSpPr/>
+        <p:nvPr/>
+      </p:nvGrpSpPr>
+      <p:grpSpPr>
+        <a:xfrm>
+          <a:off x="0" y="0"/>
+          <a:ext cx="0" cy="0"/>
+          <a:chOff x="0" y="0"/>
+          <a:chExt cx="0" cy="0"/>
+        </a:xfrm>
+      </p:grpSpPr>
+      <p:pic>
+        <p:nvPicPr>
+          <p:cNvPr id="4" name="图片 3" descr="Auto-Encoder抽象结构.png"/>
+          <p:cNvPicPr>
+            <a:picLocks noChangeAspect="1"/>
+          </p:cNvPicPr>
+          <p:nvPr/>
+        </p:nvPicPr>
+        <p:blipFill>
+          <a:blip r:embed="rId2"/>
+          <a:stretch>
+            <a:fillRect/>
+          </a:stretch>
+        </p:blipFill>
+        <p:spPr>
+          <a:xfrm>
+            <a:off x="0" y="0"/>
+            <a:ext cx="4392217" cy="1643074"/>
+          </a:xfrm>
+          <a:prstGeom prst="rect">
+            <a:avLst/>
+          </a:prstGeom>
+        </p:spPr>
+      </p:pic>
+      <p:grpSp>
+        <p:nvGrpSpPr>
+          <p:cNvPr id="25" name="组合 24"/>
+          <p:cNvGrpSpPr/>
+          <p:nvPr/>
+        </p:nvGrpSpPr>
+        <p:grpSpPr>
+          <a:xfrm>
+            <a:off x="642910" y="2214554"/>
+            <a:ext cx="7643866" cy="1714512"/>
+            <a:chOff x="428596" y="3071810"/>
+            <a:chExt cx="7643866" cy="1714512"/>
+          </a:xfrm>
+        </p:grpSpPr>
+        <p:sp>
+          <p:nvSpPr>
+            <p:cNvPr id="6" name="矩形 5"/>
+            <p:cNvSpPr/>
+            <p:nvPr/>
+          </p:nvSpPr>
+          <p:spPr>
+            <a:xfrm>
+              <a:off x="4643438" y="3214686"/>
+              <a:ext cx="1428760" cy="642942"/>
+            </a:xfrm>
+            <a:prstGeom prst="rect">
+              <a:avLst/>
+            </a:prstGeom>
+            <a:solidFill>
+              <a:schemeClr val="bg1">
+                <a:lumMod val="75000"/>
+              </a:schemeClr>
+            </a:solidFill>
+            <a:ln>
+              <a:solidFill>
+                <a:schemeClr val="tx1"/>
+              </a:solidFill>
+            </a:ln>
+          </p:spPr>
+          <p:style>
+            <a:lnRef idx="2">
+              <a:schemeClr val="accent1">
+                <a:shade val="50000"/>
+              </a:schemeClr>
+            </a:lnRef>
+            <a:fillRef idx="1">
+              <a:schemeClr val="accent1"/>
+            </a:fillRef>
+            <a:effectRef idx="0">
+              <a:schemeClr val="accent1"/>
+            </a:effectRef>
+            <a:fontRef idx="minor">
+              <a:schemeClr val="lt1"/>
+            </a:fontRef>
+          </p:style>
+          <p:txBody>
+            <a:bodyPr rtlCol="0" anchor="ctr"/>
+            <a:lstStyle/>
+            <a:p>
+              <a:pPr algn="ctr"/>
+              <a:r>
+                <a:rPr lang="zh-CN" altLang="en-US" dirty="0" smtClean="0"/>
+                <a:t>解码器</a:t>
+              </a:r>
+              <a:endParaRPr lang="zh-CN" altLang="en-US" dirty="0"/>
+            </a:p>
+          </p:txBody>
+        </p:sp>
+        <p:sp>
+          <p:nvSpPr>
+            <p:cNvPr id="5" name="矩形 4"/>
+            <p:cNvSpPr/>
+            <p:nvPr/>
+          </p:nvSpPr>
+          <p:spPr>
+            <a:xfrm>
+              <a:off x="1857356" y="3214686"/>
+              <a:ext cx="1428760" cy="642942"/>
+            </a:xfrm>
+            <a:prstGeom prst="rect">
+              <a:avLst/>
+            </a:prstGeom>
+            <a:solidFill>
+              <a:schemeClr val="bg1">
+                <a:lumMod val="75000"/>
+              </a:schemeClr>
+            </a:solidFill>
+            <a:ln>
+              <a:solidFill>
+                <a:schemeClr val="tx1"/>
+              </a:solidFill>
+            </a:ln>
+          </p:spPr>
+          <p:style>
+            <a:lnRef idx="2">
+              <a:schemeClr val="accent1">
+                <a:shade val="50000"/>
+              </a:schemeClr>
+            </a:lnRef>
+            <a:fillRef idx="1">
+              <a:schemeClr val="accent1"/>
+            </a:fillRef>
+            <a:effectRef idx="0">
+              <a:schemeClr val="accent1"/>
+            </a:effectRef>
+            <a:fontRef idx="minor">
+              <a:schemeClr val="lt1"/>
+            </a:fontRef>
+          </p:style>
+          <p:txBody>
+            <a:bodyPr rtlCol="0" anchor="ctr"/>
+            <a:lstStyle/>
+            <a:p>
+              <a:pPr algn="ctr"/>
+              <a:r>
+                <a:rPr lang="zh-CN" altLang="en-US" dirty="0" smtClean="0"/>
+                <a:t>编码器</a:t>
+              </a:r>
+              <a:endParaRPr lang="zh-CN" altLang="en-US" dirty="0"/>
+            </a:p>
+          </p:txBody>
+        </p:sp>
+        <p:sp>
+          <p:nvSpPr>
+            <p:cNvPr id="7" name="椭圆 6"/>
+            <p:cNvSpPr/>
+            <p:nvPr/>
+          </p:nvSpPr>
+          <p:spPr>
+            <a:xfrm>
+              <a:off x="7358082" y="3214686"/>
+              <a:ext cx="714380" cy="1571636"/>
+            </a:xfrm>
+            <a:prstGeom prst="ellipse">
+              <a:avLst/>
+            </a:prstGeom>
+            <a:solidFill>
+              <a:schemeClr val="bg1">
+                <a:lumMod val="75000"/>
+              </a:schemeClr>
+            </a:solidFill>
+            <a:ln>
+              <a:solidFill>
+                <a:schemeClr val="tx1"/>
+              </a:solidFill>
+            </a:ln>
+          </p:spPr>
+          <p:style>
+            <a:lnRef idx="2">
+              <a:schemeClr val="accent1">
+                <a:shade val="50000"/>
+              </a:schemeClr>
+            </a:lnRef>
+            <a:fillRef idx="1">
+              <a:schemeClr val="accent1"/>
+            </a:fillRef>
+            <a:effectRef idx="0">
+              <a:schemeClr val="accent1"/>
+            </a:effectRef>
+            <a:fontRef idx="minor">
+              <a:schemeClr val="lt1"/>
+            </a:fontRef>
+          </p:style>
+          <p:txBody>
+            <a:bodyPr rtlCol="0" anchor="ctr"/>
+            <a:lstStyle/>
+            <a:p>
+              <a:pPr algn="ctr"/>
+              <a:r>
+                <a:rPr lang="zh-CN" altLang="en-US" dirty="0" smtClean="0"/>
+                <a:t>重构误差</a:t>
+              </a:r>
+              <a:endParaRPr lang="zh-CN" altLang="en-US" dirty="0"/>
+            </a:p>
+          </p:txBody>
+        </p:sp>
+        <p:cxnSp>
+          <p:nvCxnSpPr>
+            <p:cNvPr id="9" name="直接箭头连接符 8"/>
+            <p:cNvCxnSpPr/>
+            <p:nvPr/>
+          </p:nvCxnSpPr>
+          <p:spPr>
+            <a:xfrm>
+              <a:off x="500034" y="3500438"/>
+              <a:ext cx="1357322" cy="1588"/>
+            </a:xfrm>
+            <a:prstGeom prst="straightConnector1">
+              <a:avLst/>
+            </a:prstGeom>
+            <a:ln w="28575">
+              <a:tailEnd type="arrow"/>
+            </a:ln>
+          </p:spPr>
+          <p:style>
+            <a:lnRef idx="1">
+              <a:schemeClr val="accent1"/>
+            </a:lnRef>
+            <a:fillRef idx="0">
+              <a:schemeClr val="accent1"/>
+            </a:fillRef>
+            <a:effectRef idx="0">
+              <a:schemeClr val="accent1"/>
+            </a:effectRef>
+            <a:fontRef idx="minor">
+              <a:schemeClr val="tx1"/>
+            </a:fontRef>
+          </p:style>
+        </p:cxnSp>
+        <p:cxnSp>
+          <p:nvCxnSpPr>
+            <p:cNvPr id="13" name="直接箭头连接符 12"/>
+            <p:cNvCxnSpPr/>
+            <p:nvPr/>
+          </p:nvCxnSpPr>
+          <p:spPr>
+            <a:xfrm>
+              <a:off x="3286116" y="3500438"/>
+              <a:ext cx="1357322" cy="1588"/>
+            </a:xfrm>
+            <a:prstGeom prst="straightConnector1">
+              <a:avLst/>
+            </a:prstGeom>
+            <a:ln w="28575">
+              <a:tailEnd type="arrow"/>
+            </a:ln>
+          </p:spPr>
+          <p:style>
+            <a:lnRef idx="1">
+              <a:schemeClr val="accent1"/>
+            </a:lnRef>
+            <a:fillRef idx="0">
+              <a:schemeClr val="accent1"/>
+            </a:fillRef>
+            <a:effectRef idx="0">
+              <a:schemeClr val="accent1"/>
+            </a:effectRef>
+            <a:fontRef idx="minor">
+              <a:schemeClr val="tx1"/>
+            </a:fontRef>
+          </p:style>
+        </p:cxnSp>
+        <p:cxnSp>
+          <p:nvCxnSpPr>
+            <p:cNvPr id="14" name="直接箭头连接符 13"/>
+            <p:cNvCxnSpPr/>
+            <p:nvPr/>
+          </p:nvCxnSpPr>
+          <p:spPr>
+            <a:xfrm>
+              <a:off x="6072198" y="3500438"/>
+              <a:ext cx="1357322" cy="1588"/>
+            </a:xfrm>
+            <a:prstGeom prst="straightConnector1">
+              <a:avLst/>
+            </a:prstGeom>
+            <a:ln w="28575">
+              <a:tailEnd type="arrow"/>
+            </a:ln>
+          </p:spPr>
+          <p:style>
+            <a:lnRef idx="1">
+              <a:schemeClr val="accent1"/>
+            </a:lnRef>
+            <a:fillRef idx="0">
+              <a:schemeClr val="accent1"/>
+            </a:fillRef>
+            <a:effectRef idx="0">
+              <a:schemeClr val="accent1"/>
+            </a:effectRef>
+            <a:fontRef idx="minor">
+              <a:schemeClr val="tx1"/>
+            </a:fontRef>
+          </p:style>
+        </p:cxnSp>
+        <p:cxnSp>
+          <p:nvCxnSpPr>
+            <p:cNvPr id="15" name="直接箭头连接符 14"/>
+            <p:cNvCxnSpPr/>
+            <p:nvPr/>
+          </p:nvCxnSpPr>
+          <p:spPr>
+            <a:xfrm>
+              <a:off x="1285852" y="4572008"/>
+              <a:ext cx="6143668" cy="1588"/>
+            </a:xfrm>
+            <a:prstGeom prst="straightConnector1">
+              <a:avLst/>
+            </a:prstGeom>
+            <a:ln w="28575">
+              <a:tailEnd type="arrow"/>
+            </a:ln>
+          </p:spPr>
+          <p:style>
+            <a:lnRef idx="1">
+              <a:schemeClr val="accent1"/>
+            </a:lnRef>
+            <a:fillRef idx="0">
+              <a:schemeClr val="accent1"/>
+            </a:fillRef>
+            <a:effectRef idx="0">
+              <a:schemeClr val="accent1"/>
+            </a:effectRef>
+            <a:fontRef idx="minor">
+              <a:schemeClr val="tx1"/>
+            </a:fontRef>
+          </p:style>
+        </p:cxnSp>
+        <p:cxnSp>
+          <p:nvCxnSpPr>
+            <p:cNvPr id="17" name="直接箭头连接符 16"/>
+            <p:cNvCxnSpPr/>
+            <p:nvPr/>
+          </p:nvCxnSpPr>
+          <p:spPr>
+            <a:xfrm rot="5400000">
+              <a:off x="750861" y="4035429"/>
+              <a:ext cx="1071570" cy="1588"/>
+            </a:xfrm>
+            <a:prstGeom prst="straightConnector1">
+              <a:avLst/>
+            </a:prstGeom>
+            <a:ln w="28575">
+              <a:tailEnd type="none"/>
+            </a:ln>
+          </p:spPr>
+          <p:style>
+            <a:lnRef idx="1">
+              <a:schemeClr val="accent1"/>
+            </a:lnRef>
+            <a:fillRef idx="0">
+              <a:schemeClr val="accent1"/>
+            </a:fillRef>
+            <a:effectRef idx="0">
+              <a:schemeClr val="accent1"/>
+            </a:effectRef>
+            <a:fontRef idx="minor">
+              <a:schemeClr val="tx1"/>
+            </a:fontRef>
+          </p:style>
+        </p:cxnSp>
+        <p:sp>
+          <p:nvSpPr>
+            <p:cNvPr id="21" name="TextBox 20"/>
+            <p:cNvSpPr txBox="1"/>
+            <p:nvPr/>
+          </p:nvSpPr>
+          <p:spPr>
+            <a:xfrm>
+              <a:off x="428596" y="3071810"/>
+              <a:ext cx="1000132" cy="369332"/>
+            </a:xfrm>
+            <a:prstGeom prst="rect">
+              <a:avLst/>
+            </a:prstGeom>
+            <a:noFill/>
+          </p:spPr>
+          <p:txBody>
+            <a:bodyPr wrap="square" rtlCol="0">
+              <a:spAutoFit/>
+            </a:bodyPr>
+            <a:lstStyle/>
+            <a:p>
+              <a:r>
+                <a:rPr lang="zh-CN" altLang="en-US" dirty="0" smtClean="0"/>
+                <a:t>输入</a:t>
+              </a:r>
+              <a:endParaRPr lang="zh-CN" altLang="en-US" dirty="0"/>
+            </a:p>
+          </p:txBody>
+        </p:sp>
+        <p:sp>
+          <p:nvSpPr>
+            <p:cNvPr id="22" name="TextBox 21"/>
+            <p:cNvSpPr txBox="1"/>
+            <p:nvPr/>
+          </p:nvSpPr>
+          <p:spPr>
+            <a:xfrm>
+              <a:off x="3428992" y="3071810"/>
+              <a:ext cx="1214446" cy="369332"/>
+            </a:xfrm>
+            <a:prstGeom prst="rect">
+              <a:avLst/>
+            </a:prstGeom>
+            <a:noFill/>
+          </p:spPr>
+          <p:txBody>
+            <a:bodyPr wrap="square" rtlCol="0">
+              <a:spAutoFit/>
+            </a:bodyPr>
+            <a:lstStyle/>
+            <a:p>
+              <a:r>
+                <a:rPr lang="zh-CN" altLang="en-US" dirty="0" smtClean="0"/>
+                <a:t>特征编码</a:t>
+              </a:r>
+              <a:endParaRPr lang="zh-CN" altLang="en-US" dirty="0"/>
+            </a:p>
+          </p:txBody>
+        </p:sp>
+        <p:sp>
+          <p:nvSpPr>
+            <p:cNvPr id="23" name="TextBox 22"/>
+            <p:cNvSpPr txBox="1"/>
+            <p:nvPr/>
+          </p:nvSpPr>
+          <p:spPr>
+            <a:xfrm>
+              <a:off x="6215074" y="3071810"/>
+              <a:ext cx="1000132" cy="369332"/>
+            </a:xfrm>
+            <a:prstGeom prst="rect">
+              <a:avLst/>
+            </a:prstGeom>
+            <a:noFill/>
+          </p:spPr>
+          <p:txBody>
+            <a:bodyPr wrap="square" rtlCol="0">
+              <a:spAutoFit/>
+            </a:bodyPr>
+            <a:lstStyle/>
+            <a:p>
+              <a:r>
+                <a:rPr lang="zh-CN" altLang="en-US" dirty="0" smtClean="0"/>
+                <a:t>重构</a:t>
+              </a:r>
+              <a:endParaRPr lang="zh-CN" altLang="en-US" dirty="0"/>
+            </a:p>
+          </p:txBody>
+        </p:sp>
+      </p:grpSp>
+    </p:spTree>
+  </p:cSld>
+  <p:clrMapOvr>
+    <a:masterClrMapping/>
+  </p:clrMapOvr>
+  <p:timing>
+    <p:tnLst>
+      <p:par>
+        <p:cTn id="1" dur="indefinite" restart="never" nodeType="tmRoot">
+          <p:childTnLst>
+            <p:seq concurrent="1" nextAc="seek">
+              <p:cTn id="2" dur="indefinite" nodeType="mainSeq">
+                <p:childTnLst>
+                  <p:par>
+                    <p:cTn id="3" fill="hold">
+                      <p:stCondLst>
+                        <p:cond delay="indefinite"/>
+                      </p:stCondLst>
+                      <p:childTnLst>
+                        <p:par>
+                          <p:cTn id="4" fill="hold">
+                            <p:stCondLst>
+                              <p:cond delay="0"/>
+                            </p:stCondLst>
+                            <p:childTnLst>
+                              <p:par>
+                                <p:cTn id="5" presetID="1" presetClass="entr" presetSubtype="0" fill="hold" nodeType="clickEffect">
+                                  <p:stCondLst>
+                                    <p:cond delay="0"/>
+                                  </p:stCondLst>
+                                  <p:childTnLst>
+                                    <p:set>
+                                      <p:cBhvr>
+                                        <p:cTn id="6" dur="1" fill="hold">
+                                          <p:stCondLst>
+                                            <p:cond delay="0"/>
+                                          </p:stCondLst>
+                                        </p:cTn>
+                                        <p:tgtEl>
+                                          <p:spTgt spid="4"/>
+                                        </p:tgtEl>
+                                        <p:attrNameLst>
+                                          <p:attrName>style.visibility</p:attrName>
+                                        </p:attrNameLst>
+                                      </p:cBhvr>
+                                      <p:to>
+                                        <p:strVal val="visible"/>
+                                      </p:to>
+                                    </p:set>
+                                  </p:childTnLst>
+                                </p:cTn>
+                              </p:par>
+                            </p:childTnLst>
+                          </p:cTn>
+                        </p:par>
+                      </p:childTnLst>
+                    </p:cTn>
+                  </p:par>
+                </p:childTnLst>
+              </p:cTn>
+              <p:prevCondLst>
+                <p:cond evt="onPrev" delay="0">
+                  <p:tgtEl>
+                    <p:sldTgt/>
+                  </p:tgtEl>
+                </p:cond>
+              </p:prevCondLst>
+              <p:nextCondLst>
+                <p:cond evt="onNext" delay="0">
+                  <p:tgtEl>
+                    <p:sldTgt/>
+                  </p:tgtEl>
+                </p:cond>
+              </p:nextCondLst>
+            </p:seq>
+          </p:childTnLst>
+        </p:cTn>
+      </p:par>
+    </p:tnLst>
+  </p:timing>
+</p:sld>
+</file>
+
 <file path=ppt/theme/theme1.xml><?xml version="1.0" encoding="utf-8"?>
 <a:theme xmlns:a="http://schemas.openxmlformats.org/drawingml/2006/main" name="Office 主题">
   <a:themeElements>

</xml_diff>